<commit_message>
Changing CNTT to Anuket
Signed-off-by: Gergely Csatari <gergely.csatari@nokia.com>
</commit_message>
<xml_diff>
--- a/doc/figures/cnf-wg-relation.pptx
+++ b/doc/figures/cnf-wg-relation.pptx
@@ -258,6 +258,75 @@
     </p:ext>
   </p:extLst>
 </p:presentation>
+</file>
+
+<file path=ppt/revisionInfo.xml><?xml version="1.0" encoding="utf-8"?>
+<p1510:revInfo xmlns:a="http://schemas.openxmlformats.org/drawingml/2006/main" xmlns:r="http://schemas.openxmlformats.org/officeDocument/2006/relationships" xmlns:p1510="http://schemas.microsoft.com/office/powerpoint/2015/10/main">
+  <p1510:revLst>
+    <p1510:client id="{52F26742-ADE7-4D20-B6FB-5A0C16132222}" v="14" dt="2021-03-03T13:44:35.242"/>
+  </p1510:revLst>
+</p1510:revInfo>
+</file>
+
+<file path=ppt/changesInfos/changesInfo1.xml><?xml version="1.0" encoding="utf-8"?>
+<pc:chgInfo xmlns:a="http://schemas.openxmlformats.org/drawingml/2006/main" xmlns:r="http://schemas.openxmlformats.org/officeDocument/2006/relationships" xmlns:ac="http://schemas.microsoft.com/office/drawing/2013/main/command" xmlns:pc="http://schemas.microsoft.com/office/powerpoint/2013/main/command">
+  <pc:docChgLst>
+    <pc:chgData name="Csatari, Gergely (Nokia - FI/Espoo)" userId="f5bffca3-77e4-4f86-ab35-a6eae4fbf322" providerId="ADAL" clId="{52F26742-ADE7-4D20-B6FB-5A0C16132222}"/>
+    <pc:docChg chg="modSld">
+      <pc:chgData name="Csatari, Gergely (Nokia - FI/Espoo)" userId="f5bffca3-77e4-4f86-ab35-a6eae4fbf322" providerId="ADAL" clId="{52F26742-ADE7-4D20-B6FB-5A0C16132222}" dt="2021-03-03T13:43:26.390" v="25" actId="14100"/>
+      <pc:docMkLst>
+        <pc:docMk/>
+      </pc:docMkLst>
+      <pc:sldChg chg="addSp delSp modSp">
+        <pc:chgData name="Csatari, Gergely (Nokia - FI/Espoo)" userId="f5bffca3-77e4-4f86-ab35-a6eae4fbf322" providerId="ADAL" clId="{52F26742-ADE7-4D20-B6FB-5A0C16132222}" dt="2021-03-03T13:43:26.390" v="25" actId="14100"/>
+        <pc:sldMkLst>
+          <pc:docMk/>
+          <pc:sldMk cId="2300436323" sldId="266"/>
+        </pc:sldMkLst>
+        <pc:spChg chg="add mod">
+          <ac:chgData name="Csatari, Gergely (Nokia - FI/Espoo)" userId="f5bffca3-77e4-4f86-ab35-a6eae4fbf322" providerId="ADAL" clId="{52F26742-ADE7-4D20-B6FB-5A0C16132222}" dt="2021-03-03T13:43:13.822" v="11" actId="14100"/>
+          <ac:spMkLst>
+            <pc:docMk/>
+            <pc:sldMk cId="2300436323" sldId="266"/>
+            <ac:spMk id="5" creationId="{B5A1BA8F-314E-4A3C-B9C6-F717130F4716}"/>
+          </ac:spMkLst>
+        </pc:spChg>
+        <pc:picChg chg="add mod">
+          <ac:chgData name="Csatari, Gergely (Nokia - FI/Espoo)" userId="f5bffca3-77e4-4f86-ab35-a6eae4fbf322" providerId="ADAL" clId="{52F26742-ADE7-4D20-B6FB-5A0C16132222}" dt="2021-03-03T13:43:16.349" v="14" actId="1036"/>
+          <ac:picMkLst>
+            <pc:docMk/>
+            <pc:sldMk cId="2300436323" sldId="266"/>
+            <ac:picMk id="1026" creationId="{C212FEBF-7037-4262-8C4B-A884CEA7D53B}"/>
+          </ac:picMkLst>
+        </pc:picChg>
+        <pc:picChg chg="del">
+          <ac:chgData name="Csatari, Gergely (Nokia - FI/Espoo)" userId="f5bffca3-77e4-4f86-ab35-a6eae4fbf322" providerId="ADAL" clId="{52F26742-ADE7-4D20-B6FB-5A0C16132222}" dt="2021-03-03T13:42:22.689" v="0" actId="478"/>
+          <ac:picMkLst>
+            <pc:docMk/>
+            <pc:sldMk cId="2300436323" sldId="266"/>
+            <ac:picMk id="1028" creationId="{03176C6C-6BF2-9149-A0C4-C70D25B07302}"/>
+          </ac:picMkLst>
+        </pc:picChg>
+        <pc:cxnChg chg="mod">
+          <ac:chgData name="Csatari, Gergely (Nokia - FI/Espoo)" userId="f5bffca3-77e4-4f86-ab35-a6eae4fbf322" providerId="ADAL" clId="{52F26742-ADE7-4D20-B6FB-5A0C16132222}" dt="2021-03-03T13:43:26.390" v="25" actId="14100"/>
+          <ac:cxnSpMkLst>
+            <pc:docMk/>
+            <pc:sldMk cId="2300436323" sldId="266"/>
+            <ac:cxnSpMk id="41" creationId="{752C790C-9351-2741-946F-C539C746578C}"/>
+          </ac:cxnSpMkLst>
+        </pc:cxnChg>
+        <pc:cxnChg chg="mod">
+          <ac:chgData name="Csatari, Gergely (Nokia - FI/Espoo)" userId="f5bffca3-77e4-4f86-ab35-a6eae4fbf322" providerId="ADAL" clId="{52F26742-ADE7-4D20-B6FB-5A0C16132222}" dt="2021-03-03T13:43:22.820" v="24" actId="1035"/>
+          <ac:cxnSpMkLst>
+            <pc:docMk/>
+            <pc:sldMk cId="2300436323" sldId="266"/>
+            <ac:cxnSpMk id="45" creationId="{D9548B82-2BAF-A14C-92A9-BB441C6F4EEE}"/>
+          </ac:cxnSpMkLst>
+        </pc:cxnChg>
+      </pc:sldChg>
+    </pc:docChg>
+  </pc:docChgLst>
+</pc:chgInfo>
 </file>
 
 <file path=ppt/notesMasters/notesMaster1.xml><?xml version="1.0" encoding="utf-8"?>
@@ -5485,53 +5554,6 @@
           </a:p>
         </p:txBody>
       </p:sp>
-      <p:pic>
-        <p:nvPicPr>
-          <p:cNvPr id="1028" name="Picture 4" descr="@cntt-n">
-            <a:extLst>
-              <a:ext uri="{FF2B5EF4-FFF2-40B4-BE49-F238E27FC236}">
-                <a16:creationId xmlns:a16="http://schemas.microsoft.com/office/drawing/2014/main" id="{03176C6C-6BF2-9149-A0C4-C70D25B07302}"/>
-              </a:ext>
-            </a:extLst>
-          </p:cNvPr>
-          <p:cNvPicPr>
-            <a:picLocks noChangeAspect="1" noChangeArrowheads="1"/>
-          </p:cNvPicPr>
-          <p:nvPr/>
-        </p:nvPicPr>
-        <p:blipFill>
-          <a:blip r:embed="rId4">
-            <a:extLst>
-              <a:ext uri="{28A0092B-C50C-407E-A947-70E740481C1C}">
-                <a14:useLocalDpi xmlns:a14="http://schemas.microsoft.com/office/drawing/2010/main" val="0"/>
-              </a:ext>
-            </a:extLst>
-          </a:blip>
-          <a:srcRect/>
-          <a:stretch>
-            <a:fillRect/>
-          </a:stretch>
-        </p:blipFill>
-        <p:spPr bwMode="auto">
-          <a:xfrm>
-            <a:off x="1776845" y="3808953"/>
-            <a:ext cx="572700" cy="572700"/>
-          </a:xfrm>
-          <a:prstGeom prst="rect">
-            <a:avLst/>
-          </a:prstGeom>
-          <a:noFill/>
-          <a:extLst>
-            <a:ext uri="{909E8E84-426E-40DD-AFC4-6F175D3DCCD1}">
-              <a14:hiddenFill xmlns:a14="http://schemas.microsoft.com/office/drawing/2010/main">
-                <a:solidFill>
-                  <a:srgbClr val="FFFFFF"/>
-                </a:solidFill>
-              </a14:hiddenFill>
-            </a:ext>
-          </a:extLst>
-        </p:spPr>
-      </p:pic>
       <p:cxnSp>
         <p:nvCxnSpPr>
           <p:cNvPr id="33" name="Elbow Connector 32">
@@ -5590,14 +5612,14 @@
           <p:cNvCxnSpPr>
             <a:cxnSpLocks/>
             <a:stCxn id="23" idx="2"/>
-            <a:endCxn id="1028" idx="1"/>
+            <a:endCxn id="5" idx="1"/>
           </p:cNvCxnSpPr>
           <p:nvPr/>
         </p:nvCxnSpPr>
         <p:spPr>
           <a:xfrm rot="16200000" flipH="1">
-            <a:off x="460484" y="2778941"/>
-            <a:ext cx="1794815" cy="837907"/>
+            <a:off x="370337" y="2869089"/>
+            <a:ext cx="1869710" cy="732508"/>
           </a:xfrm>
           <a:prstGeom prst="bentConnector2">
             <a:avLst/>
@@ -5762,7 +5784,7 @@
         </p:nvCxnSpPr>
         <p:spPr>
           <a:xfrm flipV="1">
-            <a:off x="2349545" y="4098126"/>
+            <a:off x="2349545" y="4153126"/>
             <a:ext cx="267051" cy="1"/>
           </a:xfrm>
           <a:prstGeom prst="straightConnector1">
@@ -5946,7 +5968,7 @@
             <p:nvPr/>
           </p:nvPicPr>
           <p:blipFill>
-            <a:blip r:embed="rId5" cstate="print">
+            <a:blip r:embed="rId4" cstate="print">
               <a:extLst>
                 <a:ext uri="{28A0092B-C50C-407E-A947-70E740481C1C}">
                   <a14:useLocalDpi xmlns:a14="http://schemas.microsoft.com/office/drawing/2010/main"/>
@@ -6054,7 +6076,7 @@
             <p:nvPr/>
           </p:nvPicPr>
           <p:blipFill>
-            <a:blip r:embed="rId5" cstate="print">
+            <a:blip r:embed="rId4" cstate="print">
               <a:extLst>
                 <a:ext uri="{28A0092B-C50C-407E-A947-70E740481C1C}">
                   <a14:useLocalDpi xmlns:a14="http://schemas.microsoft.com/office/drawing/2010/main"/>
@@ -6111,7 +6133,7 @@
             <p:nvPr/>
           </p:nvPicPr>
           <p:blipFill>
-            <a:blip r:embed="rId6" cstate="email">
+            <a:blip r:embed="rId5" cstate="email">
               <a:extLst>
                 <a:ext uri="{28A0092B-C50C-407E-A947-70E740481C1C}">
                   <a14:useLocalDpi xmlns:a14="http://schemas.microsoft.com/office/drawing/2010/main"/>
@@ -6448,7 +6470,7 @@
           <p:nvPr/>
         </p:nvPicPr>
         <p:blipFill>
-          <a:blip r:embed="rId5" cstate="print">
+          <a:blip r:embed="rId4" cstate="print">
             <a:extLst>
               <a:ext uri="{28A0092B-C50C-407E-A947-70E740481C1C}">
                 <a14:useLocalDpi xmlns:a14="http://schemas.microsoft.com/office/drawing/2010/main"/>
@@ -6529,10 +6551,10 @@
           <p:nvPr/>
         </p:nvPicPr>
         <p:blipFill>
-          <a:blip r:embed="rId7">
+          <a:blip r:embed="rId6">
             <a:extLst>
               <a:ext uri="{96DAC541-7B7A-43D3-8B79-37D633B846F1}">
-                <asvg:svgBlip xmlns:asvg="http://schemas.microsoft.com/office/drawing/2016/SVG/main" r:embed="rId8"/>
+                <asvg:svgBlip xmlns:asvg="http://schemas.microsoft.com/office/drawing/2016/SVG/main" r:embed="rId7"/>
               </a:ext>
             </a:extLst>
           </a:blip>
@@ -6565,10 +6587,10 @@
           <p:nvPr/>
         </p:nvPicPr>
         <p:blipFill>
-          <a:blip r:embed="rId9">
+          <a:blip r:embed="rId8">
             <a:extLst>
               <a:ext uri="{96DAC541-7B7A-43D3-8B79-37D633B846F1}">
-                <asvg:svgBlip xmlns:asvg="http://schemas.microsoft.com/office/drawing/2016/SVG/main" r:embed="rId10"/>
+                <asvg:svgBlip xmlns:asvg="http://schemas.microsoft.com/office/drawing/2016/SVG/main" r:embed="rId9"/>
               </a:ext>
             </a:extLst>
           </a:blip>
@@ -6680,10 +6702,10 @@
           <p:nvPr/>
         </p:nvPicPr>
         <p:blipFill>
-          <a:blip r:embed="rId11">
+          <a:blip r:embed="rId10">
             <a:extLst>
               <a:ext uri="{96DAC541-7B7A-43D3-8B79-37D633B846F1}">
-                <asvg:svgBlip xmlns:asvg="http://schemas.microsoft.com/office/drawing/2016/SVG/main" r:embed="rId12"/>
+                <asvg:svgBlip xmlns:asvg="http://schemas.microsoft.com/office/drawing/2016/SVG/main" r:embed="rId11"/>
               </a:ext>
             </a:extLst>
           </a:blip>
@@ -6852,10 +6874,10 @@
           <p:nvPr/>
         </p:nvPicPr>
         <p:blipFill>
-          <a:blip r:embed="rId13">
+          <a:blip r:embed="rId12">
             <a:extLst>
               <a:ext uri="{96DAC541-7B7A-43D3-8B79-37D633B846F1}">
-                <asvg:svgBlip xmlns:asvg="http://schemas.microsoft.com/office/drawing/2016/SVG/main" r:embed="rId14"/>
+                <asvg:svgBlip xmlns:asvg="http://schemas.microsoft.com/office/drawing/2016/SVG/main" r:embed="rId13"/>
               </a:ext>
             </a:extLst>
           </a:blip>
@@ -6989,7 +7011,7 @@
             <p:nvPr/>
           </p:nvPicPr>
           <p:blipFill>
-            <a:blip r:embed="rId15" cstate="print">
+            <a:blip r:embed="rId14" cstate="print">
               <a:extLst>
                 <a:ext uri="{28A0092B-C50C-407E-A947-70E740481C1C}">
                   <a14:useLocalDpi xmlns:a14="http://schemas.microsoft.com/office/drawing/2010/main"/>
@@ -7583,10 +7605,10 @@
           <p:nvPr/>
         </p:nvPicPr>
         <p:blipFill>
-          <a:blip r:embed="rId16">
+          <a:blip r:embed="rId15">
             <a:extLst>
               <a:ext uri="{96DAC541-7B7A-43D3-8B79-37D633B846F1}">
-                <asvg:svgBlip xmlns:asvg="http://schemas.microsoft.com/office/drawing/2016/SVG/main" r:embed="rId17"/>
+                <asvg:svgBlip xmlns:asvg="http://schemas.microsoft.com/office/drawing/2016/SVG/main" r:embed="rId16"/>
               </a:ext>
             </a:extLst>
           </a:blip>
@@ -7604,6 +7626,105 @@
           </a:prstGeom>
         </p:spPr>
       </p:pic>
+      <p:pic>
+        <p:nvPicPr>
+          <p:cNvPr id="1026" name="Picture 2">
+            <a:extLst>
+              <a:ext uri="{FF2B5EF4-FFF2-40B4-BE49-F238E27FC236}">
+                <a16:creationId xmlns:a16="http://schemas.microsoft.com/office/drawing/2014/main" id="{C212FEBF-7037-4262-8C4B-A884CEA7D53B}"/>
+              </a:ext>
+            </a:extLst>
+          </p:cNvPr>
+          <p:cNvPicPr>
+            <a:picLocks noChangeAspect="1" noChangeArrowheads="1"/>
+          </p:cNvPicPr>
+          <p:nvPr/>
+        </p:nvPicPr>
+        <p:blipFill>
+          <a:blip r:embed="rId17">
+            <a:extLst>
+              <a:ext uri="{28A0092B-C50C-407E-A947-70E740481C1C}">
+                <a14:useLocalDpi xmlns:a14="http://schemas.microsoft.com/office/drawing/2010/main" val="0"/>
+              </a:ext>
+            </a:extLst>
+          </a:blip>
+          <a:srcRect/>
+          <a:stretch>
+            <a:fillRect/>
+          </a:stretch>
+        </p:blipFill>
+        <p:spPr bwMode="auto">
+          <a:xfrm>
+            <a:off x="1705776" y="4040643"/>
+            <a:ext cx="602748" cy="224594"/>
+          </a:xfrm>
+          <a:prstGeom prst="rect">
+            <a:avLst/>
+          </a:prstGeom>
+          <a:noFill/>
+          <a:extLst>
+            <a:ext uri="{909E8E84-426E-40DD-AFC4-6F175D3DCCD1}">
+              <a14:hiddenFill xmlns:a14="http://schemas.microsoft.com/office/drawing/2010/main">
+                <a:solidFill>
+                  <a:srgbClr val="FFFFFF"/>
+                </a:solidFill>
+              </a14:hiddenFill>
+            </a:ext>
+          </a:extLst>
+        </p:spPr>
+      </p:pic>
+      <p:sp>
+        <p:nvSpPr>
+          <p:cNvPr id="5" name="Rectangle 4">
+            <a:extLst>
+              <a:ext uri="{FF2B5EF4-FFF2-40B4-BE49-F238E27FC236}">
+                <a16:creationId xmlns:a16="http://schemas.microsoft.com/office/drawing/2014/main" id="{B5A1BA8F-314E-4A3C-B9C6-F717130F4716}"/>
+              </a:ext>
+            </a:extLst>
+          </p:cNvPr>
+          <p:cNvSpPr/>
+          <p:nvPr/>
+        </p:nvSpPr>
+        <p:spPr>
+          <a:xfrm>
+            <a:off x="1671446" y="3972198"/>
+            <a:ext cx="685859" cy="395999"/>
+          </a:xfrm>
+          <a:prstGeom prst="rect">
+            <a:avLst/>
+          </a:prstGeom>
+          <a:noFill/>
+          <a:ln>
+            <a:solidFill>
+              <a:srgbClr val="2E3868"/>
+            </a:solidFill>
+          </a:ln>
+        </p:spPr>
+        <p:style>
+          <a:lnRef idx="2">
+            <a:schemeClr val="accent1">
+              <a:shade val="50000"/>
+            </a:schemeClr>
+          </a:lnRef>
+          <a:fillRef idx="1">
+            <a:schemeClr val="accent1"/>
+          </a:fillRef>
+          <a:effectRef idx="0">
+            <a:schemeClr val="accent1"/>
+          </a:effectRef>
+          <a:fontRef idx="minor">
+            <a:schemeClr val="lt1"/>
+          </a:fontRef>
+        </p:style>
+        <p:txBody>
+          <a:bodyPr rtlCol="0" anchor="ctr"/>
+          <a:lstStyle/>
+          <a:p>
+            <a:pPr algn="ctr"/>
+            <a:endParaRPr lang="hu-HU"/>
+          </a:p>
+        </p:txBody>
+      </p:sp>
     </p:spTree>
     <p:extLst>
       <p:ext uri="{BB962C8B-B14F-4D97-AF65-F5344CB8AC3E}">

</xml_diff>